<commit_message>
Update MAGFest 2024 Soldering Workshop.pptx
</commit_message>
<xml_diff>
--- a/MAGFest2023SolderingClass/MAGFest 2024 Soldering Workshop.pptx
+++ b/MAGFest2023SolderingClass/MAGFest 2024 Soldering Workshop.pptx
@@ -167,6 +167,9 @@
           </p14:sldIdLst>
         </p14:section>
       </p14:sectionLst>
+    </p:ext>
+    <p:ext uri="{EFAFB233-063F-42B5-8137-9DF3F51BA10A}">
+      <p15:sldGuideLst xmlns:p15="http://schemas.microsoft.com/office/powerpoint/2012/main"/>
     </p:ext>
   </p:extLst>
 </p:presentation>
@@ -3304,7 +3307,7 @@
           <a:p>
             <a:fld id="{C655105B-81AF-4ECF-B69A-9D9243C35725}" type="datetimeFigureOut">
               <a:rPr lang="en-US" smtClean="0"/>
-              <a:t>1/10/2024</a:t>
+              <a:t>1/16/2024</a:t>
             </a:fld>
             <a:endParaRPr lang="en-US"/>
           </a:p>
@@ -3474,7 +3477,7 @@
           <a:p>
             <a:fld id="{C655105B-81AF-4ECF-B69A-9D9243C35725}" type="datetimeFigureOut">
               <a:rPr lang="en-US" smtClean="0"/>
-              <a:t>1/10/2024</a:t>
+              <a:t>1/16/2024</a:t>
             </a:fld>
             <a:endParaRPr lang="en-US"/>
           </a:p>
@@ -3654,7 +3657,7 @@
           <a:p>
             <a:fld id="{C655105B-81AF-4ECF-B69A-9D9243C35725}" type="datetimeFigureOut">
               <a:rPr lang="en-US" smtClean="0"/>
-              <a:t>1/10/2024</a:t>
+              <a:t>1/16/2024</a:t>
             </a:fld>
             <a:endParaRPr lang="en-US"/>
           </a:p>
@@ -3824,7 +3827,7 @@
           <a:p>
             <a:fld id="{C655105B-81AF-4ECF-B69A-9D9243C35725}" type="datetimeFigureOut">
               <a:rPr lang="en-US" smtClean="0"/>
-              <a:t>1/10/2024</a:t>
+              <a:t>1/16/2024</a:t>
             </a:fld>
             <a:endParaRPr lang="en-US"/>
           </a:p>
@@ -4070,7 +4073,7 @@
           <a:p>
             <a:fld id="{C655105B-81AF-4ECF-B69A-9D9243C35725}" type="datetimeFigureOut">
               <a:rPr lang="en-US" smtClean="0"/>
-              <a:t>1/10/2024</a:t>
+              <a:t>1/16/2024</a:t>
             </a:fld>
             <a:endParaRPr lang="en-US"/>
           </a:p>
@@ -4302,7 +4305,7 @@
           <a:p>
             <a:fld id="{C655105B-81AF-4ECF-B69A-9D9243C35725}" type="datetimeFigureOut">
               <a:rPr lang="en-US" smtClean="0"/>
-              <a:t>1/10/2024</a:t>
+              <a:t>1/16/2024</a:t>
             </a:fld>
             <a:endParaRPr lang="en-US"/>
           </a:p>
@@ -4669,7 +4672,7 @@
           <a:p>
             <a:fld id="{C655105B-81AF-4ECF-B69A-9D9243C35725}" type="datetimeFigureOut">
               <a:rPr lang="en-US" smtClean="0"/>
-              <a:t>1/10/2024</a:t>
+              <a:t>1/16/2024</a:t>
             </a:fld>
             <a:endParaRPr lang="en-US"/>
           </a:p>
@@ -4787,7 +4790,7 @@
           <a:p>
             <a:fld id="{C655105B-81AF-4ECF-B69A-9D9243C35725}" type="datetimeFigureOut">
               <a:rPr lang="en-US" smtClean="0"/>
-              <a:t>1/10/2024</a:t>
+              <a:t>1/16/2024</a:t>
             </a:fld>
             <a:endParaRPr lang="en-US"/>
           </a:p>
@@ -4882,7 +4885,7 @@
           <a:p>
             <a:fld id="{C655105B-81AF-4ECF-B69A-9D9243C35725}" type="datetimeFigureOut">
               <a:rPr lang="en-US" smtClean="0"/>
-              <a:t>1/10/2024</a:t>
+              <a:t>1/16/2024</a:t>
             </a:fld>
             <a:endParaRPr lang="en-US"/>
           </a:p>
@@ -5159,7 +5162,7 @@
           <a:p>
             <a:fld id="{C655105B-81AF-4ECF-B69A-9D9243C35725}" type="datetimeFigureOut">
               <a:rPr lang="en-US" smtClean="0"/>
-              <a:t>1/10/2024</a:t>
+              <a:t>1/16/2024</a:t>
             </a:fld>
             <a:endParaRPr lang="en-US"/>
           </a:p>
@@ -5416,7 +5419,7 @@
           <a:p>
             <a:fld id="{C655105B-81AF-4ECF-B69A-9D9243C35725}" type="datetimeFigureOut">
               <a:rPr lang="en-US" smtClean="0"/>
-              <a:t>1/10/2024</a:t>
+              <a:t>1/16/2024</a:t>
             </a:fld>
             <a:endParaRPr lang="en-US"/>
           </a:p>
@@ -5629,7 +5632,7 @@
           <a:p>
             <a:fld id="{C655105B-81AF-4ECF-B69A-9D9243C35725}" type="datetimeFigureOut">
               <a:rPr lang="en-US" smtClean="0"/>
-              <a:t>1/10/2024</a:t>
+              <a:t>1/16/2024</a:t>
             </a:fld>
             <a:endParaRPr lang="en-US"/>
           </a:p>
@@ -9471,7 +9474,7 @@
           <a:p>
             <a:r>
               <a:rPr lang="en-US" dirty="0"/>
-              <a:t>U1 Diode Array</a:t>
+              <a:t>U1 MCU</a:t>
             </a:r>
           </a:p>
         </p:txBody>
@@ -9840,7 +9843,7 @@
           <a:p>
             <a:r>
               <a:rPr lang="en-US" dirty="0"/>
-              <a:t>U2 MCU</a:t>
+              <a:t>U2 Diode Array</a:t>
             </a:r>
           </a:p>
         </p:txBody>
@@ -9893,7 +9896,7 @@
           <a:p>
             <a:r>
               <a:rPr lang="en-US" dirty="0"/>
-              <a:t>Value =</a:t>
+              <a:t>Value = ULN2002</a:t>
             </a:r>
             <a:br>
               <a:rPr lang="en-US" dirty="0"/>

</xml_diff>